<commit_message>
Update Forecasting Metrics Screenshots.pptx
</commit_message>
<xml_diff>
--- a/Forecasting Metrics Screenshots.pptx
+++ b/Forecasting Metrics Screenshots.pptx
@@ -310,7 +310,7 @@
           <a:p>
             <a:fld id="{5BCAD085-E8A6-8845-BD4E-CB4CCA059FC4}" type="datetimeFigureOut">
               <a:rPr lang="en-US" smtClean="0"/>
-              <a:t>7/16/25</a:t>
+              <a:t>7/18/25</a:t>
             </a:fld>
             <a:endParaRPr lang="en-US"/>
           </a:p>
@@ -478,7 +478,7 @@
           <a:p>
             <a:fld id="{5BCAD085-E8A6-8845-BD4E-CB4CCA059FC4}" type="datetimeFigureOut">
               <a:rPr lang="en-US" smtClean="0"/>
-              <a:t>7/16/25</a:t>
+              <a:t>7/18/25</a:t>
             </a:fld>
             <a:endParaRPr lang="en-US"/>
           </a:p>
@@ -656,7 +656,7 @@
           <a:p>
             <a:fld id="{5BCAD085-E8A6-8845-BD4E-CB4CCA059FC4}" type="datetimeFigureOut">
               <a:rPr lang="en-US" smtClean="0"/>
-              <a:t>7/16/25</a:t>
+              <a:t>7/18/25</a:t>
             </a:fld>
             <a:endParaRPr lang="en-US"/>
           </a:p>
@@ -824,7 +824,7 @@
           <a:p>
             <a:fld id="{5BCAD085-E8A6-8845-BD4E-CB4CCA059FC4}" type="datetimeFigureOut">
               <a:rPr lang="en-US" smtClean="0"/>
-              <a:t>7/16/25</a:t>
+              <a:t>7/18/25</a:t>
             </a:fld>
             <a:endParaRPr lang="en-US"/>
           </a:p>
@@ -1069,7 +1069,7 @@
           <a:p>
             <a:fld id="{5BCAD085-E8A6-8845-BD4E-CB4CCA059FC4}" type="datetimeFigureOut">
               <a:rPr lang="en-US" smtClean="0"/>
-              <a:t>7/16/25</a:t>
+              <a:t>7/18/25</a:t>
             </a:fld>
             <a:endParaRPr lang="en-US"/>
           </a:p>
@@ -1354,7 +1354,7 @@
           <a:p>
             <a:fld id="{5BCAD085-E8A6-8845-BD4E-CB4CCA059FC4}" type="datetimeFigureOut">
               <a:rPr lang="en-US" smtClean="0"/>
-              <a:t>7/16/25</a:t>
+              <a:t>7/18/25</a:t>
             </a:fld>
             <a:endParaRPr lang="en-US"/>
           </a:p>
@@ -1773,7 +1773,7 @@
           <a:p>
             <a:fld id="{5BCAD085-E8A6-8845-BD4E-CB4CCA059FC4}" type="datetimeFigureOut">
               <a:rPr lang="en-US" smtClean="0"/>
-              <a:t>7/16/25</a:t>
+              <a:t>7/18/25</a:t>
             </a:fld>
             <a:endParaRPr lang="en-US"/>
           </a:p>
@@ -1890,7 +1890,7 @@
           <a:p>
             <a:fld id="{5BCAD085-E8A6-8845-BD4E-CB4CCA059FC4}" type="datetimeFigureOut">
               <a:rPr lang="en-US" smtClean="0"/>
-              <a:t>7/16/25</a:t>
+              <a:t>7/18/25</a:t>
             </a:fld>
             <a:endParaRPr lang="en-US"/>
           </a:p>
@@ -1985,7 +1985,7 @@
           <a:p>
             <a:fld id="{5BCAD085-E8A6-8845-BD4E-CB4CCA059FC4}" type="datetimeFigureOut">
               <a:rPr lang="en-US" smtClean="0"/>
-              <a:t>7/16/25</a:t>
+              <a:t>7/18/25</a:t>
             </a:fld>
             <a:endParaRPr lang="en-US"/>
           </a:p>
@@ -2260,7 +2260,7 @@
           <a:p>
             <a:fld id="{5BCAD085-E8A6-8845-BD4E-CB4CCA059FC4}" type="datetimeFigureOut">
               <a:rPr lang="en-US" smtClean="0"/>
-              <a:t>7/16/25</a:t>
+              <a:t>7/18/25</a:t>
             </a:fld>
             <a:endParaRPr lang="en-US"/>
           </a:p>
@@ -2512,7 +2512,7 @@
           <a:p>
             <a:fld id="{5BCAD085-E8A6-8845-BD4E-CB4CCA059FC4}" type="datetimeFigureOut">
               <a:rPr lang="en-US" smtClean="0"/>
-              <a:t>7/16/25</a:t>
+              <a:t>7/18/25</a:t>
             </a:fld>
             <a:endParaRPr lang="en-US"/>
           </a:p>
@@ -2723,7 +2723,7 @@
           <a:p>
             <a:fld id="{5BCAD085-E8A6-8845-BD4E-CB4CCA059FC4}" type="datetimeFigureOut">
               <a:rPr lang="en-US" smtClean="0"/>
-              <a:t>7/16/25</a:t>
+              <a:t>7/18/25</a:t>
             </a:fld>
             <a:endParaRPr lang="en-US"/>
           </a:p>
@@ -3258,10 +3258,10 @@
       </p:grpSpPr>
       <p:pic>
         <p:nvPicPr>
-          <p:cNvPr id="2" name="Picture 1">
+          <p:cNvPr id="5" name="Picture 4">
             <a:extLst>
               <a:ext uri="{FF2B5EF4-FFF2-40B4-BE49-F238E27FC236}">
-                <a16:creationId xmlns:a16="http://schemas.microsoft.com/office/drawing/2014/main" id="{BA3DB1A2-A09B-C218-CB5C-C8D05FDDE0C7}"/>
+                <a16:creationId xmlns:a16="http://schemas.microsoft.com/office/drawing/2014/main" id="{AA9FC5AE-1BEF-EBC0-DC47-16AFC4E7B461}"/>
               </a:ext>
             </a:extLst>
           </p:cNvPr>

</xml_diff>